<commit_message>
Added IPython section and additional resources
</commit_message>
<xml_diff>
--- a/diagrams/Diagrams for LLC Python Resources.pptx
+++ b/diagrams/Diagrams for LLC Python Resources.pptx
@@ -6,6 +6,7 @@
   </p:sldMasterIdLst>
   <p:sldIdLst>
     <p:sldId id="256" r:id="rId2"/>
+    <p:sldId id="257" r:id="rId3"/>
   </p:sldIdLst>
   <p:sldSz cx="12192000" cy="6858000"/>
   <p:notesSz cx="6858000" cy="9144000"/>
@@ -243,7 +244,7 @@
           <a:p>
             <a:fld id="{846CE7D5-CF57-46EF-B807-FDD0502418D4}" type="datetimeFigureOut">
               <a:rPr lang="en-US" smtClean="0"/>
-              <a:t>4/30/2018</a:t>
+              <a:t>5/3/2018</a:t>
             </a:fld>
             <a:endParaRPr lang="en-US"/>
           </a:p>
@@ -413,7 +414,7 @@
           <a:p>
             <a:fld id="{846CE7D5-CF57-46EF-B807-FDD0502418D4}" type="datetimeFigureOut">
               <a:rPr lang="en-US" smtClean="0"/>
-              <a:t>4/30/2018</a:t>
+              <a:t>5/3/2018</a:t>
             </a:fld>
             <a:endParaRPr lang="en-US"/>
           </a:p>
@@ -593,7 +594,7 @@
           <a:p>
             <a:fld id="{846CE7D5-CF57-46EF-B807-FDD0502418D4}" type="datetimeFigureOut">
               <a:rPr lang="en-US" smtClean="0"/>
-              <a:t>4/30/2018</a:t>
+              <a:t>5/3/2018</a:t>
             </a:fld>
             <a:endParaRPr lang="en-US"/>
           </a:p>
@@ -763,7 +764,7 @@
           <a:p>
             <a:fld id="{846CE7D5-CF57-46EF-B807-FDD0502418D4}" type="datetimeFigureOut">
               <a:rPr lang="en-US" smtClean="0"/>
-              <a:t>4/30/2018</a:t>
+              <a:t>5/3/2018</a:t>
             </a:fld>
             <a:endParaRPr lang="en-US"/>
           </a:p>
@@ -1009,7 +1010,7 @@
           <a:p>
             <a:fld id="{846CE7D5-CF57-46EF-B807-FDD0502418D4}" type="datetimeFigureOut">
               <a:rPr lang="en-US" smtClean="0"/>
-              <a:t>4/30/2018</a:t>
+              <a:t>5/3/2018</a:t>
             </a:fld>
             <a:endParaRPr lang="en-US"/>
           </a:p>
@@ -1241,7 +1242,7 @@
           <a:p>
             <a:fld id="{846CE7D5-CF57-46EF-B807-FDD0502418D4}" type="datetimeFigureOut">
               <a:rPr lang="en-US" smtClean="0"/>
-              <a:t>4/30/2018</a:t>
+              <a:t>5/3/2018</a:t>
             </a:fld>
             <a:endParaRPr lang="en-US"/>
           </a:p>
@@ -1608,7 +1609,7 @@
           <a:p>
             <a:fld id="{846CE7D5-CF57-46EF-B807-FDD0502418D4}" type="datetimeFigureOut">
               <a:rPr lang="en-US" smtClean="0"/>
-              <a:t>4/30/2018</a:t>
+              <a:t>5/3/2018</a:t>
             </a:fld>
             <a:endParaRPr lang="en-US"/>
           </a:p>
@@ -1726,7 +1727,7 @@
           <a:p>
             <a:fld id="{846CE7D5-CF57-46EF-B807-FDD0502418D4}" type="datetimeFigureOut">
               <a:rPr lang="en-US" smtClean="0"/>
-              <a:t>4/30/2018</a:t>
+              <a:t>5/3/2018</a:t>
             </a:fld>
             <a:endParaRPr lang="en-US"/>
           </a:p>
@@ -1821,7 +1822,7 @@
           <a:p>
             <a:fld id="{846CE7D5-CF57-46EF-B807-FDD0502418D4}" type="datetimeFigureOut">
               <a:rPr lang="en-US" smtClean="0"/>
-              <a:t>4/30/2018</a:t>
+              <a:t>5/3/2018</a:t>
             </a:fld>
             <a:endParaRPr lang="en-US"/>
           </a:p>
@@ -2098,7 +2099,7 @@
           <a:p>
             <a:fld id="{846CE7D5-CF57-46EF-B807-FDD0502418D4}" type="datetimeFigureOut">
               <a:rPr lang="en-US" smtClean="0"/>
-              <a:t>4/30/2018</a:t>
+              <a:t>5/3/2018</a:t>
             </a:fld>
             <a:endParaRPr lang="en-US"/>
           </a:p>
@@ -2355,7 +2356,7 @@
           <a:p>
             <a:fld id="{846CE7D5-CF57-46EF-B807-FDD0502418D4}" type="datetimeFigureOut">
               <a:rPr lang="en-US" smtClean="0"/>
-              <a:t>4/30/2018</a:t>
+              <a:t>5/3/2018</a:t>
             </a:fld>
             <a:endParaRPr lang="en-US"/>
           </a:p>
@@ -2568,7 +2569,7 @@
           <a:p>
             <a:fld id="{846CE7D5-CF57-46EF-B807-FDD0502418D4}" type="datetimeFigureOut">
               <a:rPr lang="en-US" smtClean="0"/>
-              <a:t>4/30/2018</a:t>
+              <a:t>5/3/2018</a:t>
             </a:fld>
             <a:endParaRPr lang="en-US"/>
           </a:p>
@@ -2988,8 +2989,14 @@
           <p:nvPr/>
         </p:nvPicPr>
         <p:blipFill rotWithShape="1">
-          <a:blip r:embed="rId2"/>
-          <a:srcRect t="17500" b="1250"/>
+          <a:blip r:embed="rId2" cstate="hqprint">
+            <a:extLst>
+              <a:ext uri="{28A0092B-C50C-407E-A947-70E740481C1C}">
+                <a14:useLocalDpi xmlns:a14="http://schemas.microsoft.com/office/drawing/2010/main"/>
+              </a:ext>
+            </a:extLst>
+          </a:blip>
+          <a:srcRect/>
           <a:stretch/>
         </p:blipFill>
         <p:spPr>
@@ -3047,7 +3054,13 @@
           <p:nvPr/>
         </p:nvPicPr>
         <p:blipFill>
-          <a:blip r:embed="rId4"/>
+          <a:blip r:embed="rId4" cstate="hqprint">
+            <a:extLst>
+              <a:ext uri="{28A0092B-C50C-407E-A947-70E740481C1C}">
+                <a14:useLocalDpi xmlns:a14="http://schemas.microsoft.com/office/drawing/2010/main"/>
+              </a:ext>
+            </a:extLst>
+          </a:blip>
           <a:stretch>
             <a:fillRect/>
           </a:stretch>
@@ -3137,7 +3150,13 @@
           <p:nvPr/>
         </p:nvPicPr>
         <p:blipFill>
-          <a:blip r:embed="rId7"/>
+          <a:blip r:embed="rId7" cstate="hqprint">
+            <a:extLst>
+              <a:ext uri="{28A0092B-C50C-407E-A947-70E740481C1C}">
+                <a14:useLocalDpi xmlns:a14="http://schemas.microsoft.com/office/drawing/2010/main"/>
+              </a:ext>
+            </a:extLst>
+          </a:blip>
           <a:stretch>
             <a:fillRect/>
           </a:stretch>
@@ -3290,6 +3309,74 @@
     <p:extLst>
       <p:ext uri="{BB962C8B-B14F-4D97-AF65-F5344CB8AC3E}">
         <p14:creationId xmlns:p14="http://schemas.microsoft.com/office/powerpoint/2010/main" val="109857222"/>
+      </p:ext>
+    </p:extLst>
+  </p:cSld>
+  <p:clrMapOvr>
+    <a:masterClrMapping/>
+  </p:clrMapOvr>
+</p:sld>
+</file>
+
+<file path=ppt/slides/slide2.xml><?xml version="1.0" encoding="utf-8"?>
+<p:sld xmlns:a="http://schemas.openxmlformats.org/drawingml/2006/main" xmlns:r="http://schemas.openxmlformats.org/officeDocument/2006/relationships" xmlns:p="http://schemas.openxmlformats.org/presentationml/2006/main">
+  <p:cSld>
+    <p:spTree>
+      <p:nvGrpSpPr>
+        <p:cNvPr id="1" name=""/>
+        <p:cNvGrpSpPr/>
+        <p:nvPr/>
+      </p:nvGrpSpPr>
+      <p:grpSpPr>
+        <a:xfrm>
+          <a:off x="0" y="0"/>
+          <a:ext cx="0" cy="0"/>
+          <a:chOff x="0" y="0"/>
+          <a:chExt cx="0" cy="0"/>
+        </a:xfrm>
+      </p:grpSpPr>
+      <p:pic>
+        <p:nvPicPr>
+          <p:cNvPr id="2" name="Picture 10">
+            <a:extLst>
+              <a:ext uri="{FF2B5EF4-FFF2-40B4-BE49-F238E27FC236}">
+                <a16:creationId xmlns:a16="http://schemas.microsoft.com/office/drawing/2014/main" id="{1B398FB6-04E6-44F5-ABA5-E2A30CA33E4F}"/>
+              </a:ext>
+            </a:extLst>
+          </p:cNvPr>
+          <p:cNvPicPr>
+            <a:picLocks noChangeAspect="1"/>
+          </p:cNvPicPr>
+          <p:nvPr/>
+        </p:nvPicPr>
+        <p:blipFill>
+          <a:blip r:embed="rId2"/>
+          <a:stretch>
+            <a:fillRect/>
+          </a:stretch>
+        </p:blipFill>
+        <p:spPr>
+          <a:xfrm>
+            <a:off x="4322614" y="2550078"/>
+            <a:ext cx="2743200" cy="926572"/>
+          </a:xfrm>
+          <a:prstGeom prst="rect">
+            <a:avLst/>
+          </a:prstGeom>
+          <a:ln w="25400" cap="sq">
+            <a:solidFill>
+              <a:schemeClr val="bg2">
+                <a:lumMod val="50000"/>
+              </a:schemeClr>
+            </a:solidFill>
+            <a:bevel/>
+          </a:ln>
+        </p:spPr>
+      </p:pic>
+    </p:spTree>
+    <p:extLst>
+      <p:ext uri="{BB962C8B-B14F-4D97-AF65-F5344CB8AC3E}">
+        <p14:creationId xmlns:p14="http://schemas.microsoft.com/office/powerpoint/2010/main" val="390236958"/>
       </p:ext>
     </p:extLst>
   </p:cSld>

</xml_diff>